<commit_message>
Updated part 1 - should be done now
It should be done now.
</commit_message>
<xml_diff>
--- a/SlidesChange/part1.pptx
+++ b/SlidesChange/part1.pptx
@@ -9,6 +9,11 @@
     <p:sldId id="257" r:id="rId3"/>
     <p:sldId id="258" r:id="rId4"/>
     <p:sldId id="259" r:id="rId5"/>
+    <p:sldId id="260" r:id="rId6"/>
+    <p:sldId id="261" r:id="rId7"/>
+    <p:sldId id="262" r:id="rId8"/>
+    <p:sldId id="263" r:id="rId9"/>
+    <p:sldId id="264" r:id="rId10"/>
   </p:sldIdLst>
   <p:sldSz cx="12192000" cy="6858000"/>
   <p:notesSz cx="6858000" cy="9144000"/>
@@ -107,6 +112,11 @@
       </a:defRPr>
     </a:lvl9pPr>
   </p:defaultTextStyle>
+  <p:extLst>
+    <p:ext uri="{EFAFB233-063F-42B5-8137-9DF3F51BA10A}">
+      <p15:sldGuideLst xmlns:p15="http://schemas.microsoft.com/office/powerpoint/2012/main"/>
+    </p:ext>
+  </p:extLst>
 </p:presentation>
 </file>
 
@@ -241,7 +251,7 @@
           <a:p>
             <a:fld id="{DAB3F5F1-5A6D-4FA5-9404-973DAE83B506}" type="datetimeFigureOut">
               <a:rPr lang="en-US" smtClean="0"/>
-              <a:t>2/7/2018</a:t>
+              <a:t>2/9/2018</a:t>
             </a:fld>
             <a:endParaRPr lang="en-US"/>
           </a:p>
@@ -411,7 +421,7 @@
           <a:p>
             <a:fld id="{DAB3F5F1-5A6D-4FA5-9404-973DAE83B506}" type="datetimeFigureOut">
               <a:rPr lang="en-US" smtClean="0"/>
-              <a:t>2/7/2018</a:t>
+              <a:t>2/9/2018</a:t>
             </a:fld>
             <a:endParaRPr lang="en-US"/>
           </a:p>
@@ -591,7 +601,7 @@
           <a:p>
             <a:fld id="{DAB3F5F1-5A6D-4FA5-9404-973DAE83B506}" type="datetimeFigureOut">
               <a:rPr lang="en-US" smtClean="0"/>
-              <a:t>2/7/2018</a:t>
+              <a:t>2/9/2018</a:t>
             </a:fld>
             <a:endParaRPr lang="en-US"/>
           </a:p>
@@ -761,7 +771,7 @@
           <a:p>
             <a:fld id="{DAB3F5F1-5A6D-4FA5-9404-973DAE83B506}" type="datetimeFigureOut">
               <a:rPr lang="en-US" smtClean="0"/>
-              <a:t>2/7/2018</a:t>
+              <a:t>2/9/2018</a:t>
             </a:fld>
             <a:endParaRPr lang="en-US"/>
           </a:p>
@@ -1007,7 +1017,7 @@
           <a:p>
             <a:fld id="{DAB3F5F1-5A6D-4FA5-9404-973DAE83B506}" type="datetimeFigureOut">
               <a:rPr lang="en-US" smtClean="0"/>
-              <a:t>2/7/2018</a:t>
+              <a:t>2/9/2018</a:t>
             </a:fld>
             <a:endParaRPr lang="en-US"/>
           </a:p>
@@ -1239,7 +1249,7 @@
           <a:p>
             <a:fld id="{DAB3F5F1-5A6D-4FA5-9404-973DAE83B506}" type="datetimeFigureOut">
               <a:rPr lang="en-US" smtClean="0"/>
-              <a:t>2/7/2018</a:t>
+              <a:t>2/9/2018</a:t>
             </a:fld>
             <a:endParaRPr lang="en-US"/>
           </a:p>
@@ -1606,7 +1616,7 @@
           <a:p>
             <a:fld id="{DAB3F5F1-5A6D-4FA5-9404-973DAE83B506}" type="datetimeFigureOut">
               <a:rPr lang="en-US" smtClean="0"/>
-              <a:t>2/7/2018</a:t>
+              <a:t>2/9/2018</a:t>
             </a:fld>
             <a:endParaRPr lang="en-US"/>
           </a:p>
@@ -1724,7 +1734,7 @@
           <a:p>
             <a:fld id="{DAB3F5F1-5A6D-4FA5-9404-973DAE83B506}" type="datetimeFigureOut">
               <a:rPr lang="en-US" smtClean="0"/>
-              <a:t>2/7/2018</a:t>
+              <a:t>2/9/2018</a:t>
             </a:fld>
             <a:endParaRPr lang="en-US"/>
           </a:p>
@@ -1819,7 +1829,7 @@
           <a:p>
             <a:fld id="{DAB3F5F1-5A6D-4FA5-9404-973DAE83B506}" type="datetimeFigureOut">
               <a:rPr lang="en-US" smtClean="0"/>
-              <a:t>2/7/2018</a:t>
+              <a:t>2/9/2018</a:t>
             </a:fld>
             <a:endParaRPr lang="en-US"/>
           </a:p>
@@ -2096,7 +2106,7 @@
           <a:p>
             <a:fld id="{DAB3F5F1-5A6D-4FA5-9404-973DAE83B506}" type="datetimeFigureOut">
               <a:rPr lang="en-US" smtClean="0"/>
-              <a:t>2/7/2018</a:t>
+              <a:t>2/9/2018</a:t>
             </a:fld>
             <a:endParaRPr lang="en-US"/>
           </a:p>
@@ -2349,7 +2359,7 @@
           <a:p>
             <a:fld id="{DAB3F5F1-5A6D-4FA5-9404-973DAE83B506}" type="datetimeFigureOut">
               <a:rPr lang="en-US" smtClean="0"/>
-              <a:t>2/7/2018</a:t>
+              <a:t>2/9/2018</a:t>
             </a:fld>
             <a:endParaRPr lang="en-US"/>
           </a:p>
@@ -2562,7 +2572,7 @@
           <a:p>
             <a:fld id="{DAB3F5F1-5A6D-4FA5-9404-973DAE83B506}" type="datetimeFigureOut">
               <a:rPr lang="en-US" smtClean="0"/>
-              <a:t>2/7/2018</a:t>
+              <a:t>2/9/2018</a:t>
             </a:fld>
             <a:endParaRPr lang="en-US"/>
           </a:p>
@@ -3111,13 +3121,8 @@
             </a:r>
             <a:r>
               <a:rPr lang="en-US" dirty="0" smtClean="0"/>
-              <a:t> is an instance of </a:t>
-            </a:r>
-            <a:r>
-              <a:rPr lang="en-US" smtClean="0"/>
-              <a:t>a class</a:t>
-            </a:r>
-            <a:endParaRPr lang="en-US" dirty="0" smtClean="0"/>
+              <a:t> is an instance of a class</a:t>
+            </a:r>
           </a:p>
           <a:p>
             <a:r>
@@ -3365,10 +3370,608 @@
           </a:p>
         </p:txBody>
       </p:sp>
+      <p:pic>
+        <p:nvPicPr>
+          <p:cNvPr id="4" name="Picture 3"/>
+          <p:cNvPicPr>
+            <a:picLocks noChangeAspect="1"/>
+          </p:cNvPicPr>
+          <p:nvPr/>
+        </p:nvPicPr>
+        <p:blipFill rotWithShape="1">
+          <a:blip r:embed="rId2">
+            <a:extLst>
+              <a:ext uri="{28A0092B-C50C-407E-A947-70E740481C1C}">
+                <a14:useLocalDpi xmlns:a14="http://schemas.microsoft.com/office/drawing/2010/main" val="0"/>
+              </a:ext>
+            </a:extLst>
+          </a:blip>
+          <a:srcRect t="3442"/>
+          <a:stretch/>
+        </p:blipFill>
+        <p:spPr>
+          <a:xfrm>
+            <a:off x="1673678" y="3940743"/>
+            <a:ext cx="8844643" cy="2781665"/>
+          </a:xfrm>
+          <a:prstGeom prst="rect">
+            <a:avLst/>
+          </a:prstGeom>
+        </p:spPr>
+      </p:pic>
     </p:spTree>
     <p:extLst>
       <p:ext uri="{BB962C8B-B14F-4D97-AF65-F5344CB8AC3E}">
         <p14:creationId xmlns:p14="http://schemas.microsoft.com/office/powerpoint/2010/main" val="206911519"/>
+      </p:ext>
+    </p:extLst>
+  </p:cSld>
+  <p:clrMapOvr>
+    <a:masterClrMapping/>
+  </p:clrMapOvr>
+</p:sld>
+</file>
+
+<file path=ppt/slides/slide5.xml><?xml version="1.0" encoding="utf-8"?>
+<p:sld xmlns:a="http://schemas.openxmlformats.org/drawingml/2006/main" xmlns:r="http://schemas.openxmlformats.org/officeDocument/2006/relationships" xmlns:p="http://schemas.openxmlformats.org/presentationml/2006/main">
+  <p:cSld>
+    <p:spTree>
+      <p:nvGrpSpPr>
+        <p:cNvPr id="1" name=""/>
+        <p:cNvGrpSpPr/>
+        <p:nvPr/>
+      </p:nvGrpSpPr>
+      <p:grpSpPr>
+        <a:xfrm>
+          <a:off x="0" y="0"/>
+          <a:ext cx="0" cy="0"/>
+          <a:chOff x="0" y="0"/>
+          <a:chExt cx="0" cy="0"/>
+        </a:xfrm>
+      </p:grpSpPr>
+      <p:sp>
+        <p:nvSpPr>
+          <p:cNvPr id="2" name="Title 1"/>
+          <p:cNvSpPr>
+            <a:spLocks noGrp="1"/>
+          </p:cNvSpPr>
+          <p:nvPr>
+            <p:ph type="title"/>
+          </p:nvPr>
+        </p:nvSpPr>
+        <p:spPr/>
+        <p:txBody>
+          <a:bodyPr/>
+          <a:lstStyle/>
+          <a:p>
+            <a:r>
+              <a:rPr lang="en-US" dirty="0" smtClean="0"/>
+              <a:t>Parts of a class</a:t>
+            </a:r>
+            <a:endParaRPr lang="en-US" dirty="0"/>
+          </a:p>
+        </p:txBody>
+      </p:sp>
+      <p:sp>
+        <p:nvSpPr>
+          <p:cNvPr id="3" name="Content Placeholder 2"/>
+          <p:cNvSpPr>
+            <a:spLocks noGrp="1"/>
+          </p:cNvSpPr>
+          <p:nvPr>
+            <p:ph idx="1"/>
+          </p:nvPr>
+        </p:nvSpPr>
+        <p:spPr/>
+        <p:txBody>
+          <a:bodyPr/>
+          <a:lstStyle/>
+          <a:p>
+            <a:r>
+              <a:rPr lang="en-US" dirty="0" smtClean="0"/>
+              <a:t>Operations define what an instance can do</a:t>
+            </a:r>
+          </a:p>
+          <a:p>
+            <a:pPr lvl="1"/>
+            <a:r>
+              <a:rPr lang="en-US" dirty="0" err="1" smtClean="0"/>
+              <a:t>SetDate</a:t>
+            </a:r>
+            <a:r>
+              <a:rPr lang="en-US" dirty="0" smtClean="0"/>
+              <a:t>(d) in Watch applies to both, but </a:t>
+            </a:r>
+            <a:r>
+              <a:rPr lang="en-US" dirty="0" err="1" smtClean="0"/>
+              <a:t>InputNumber</a:t>
+            </a:r>
+            <a:r>
+              <a:rPr lang="en-US" dirty="0" smtClean="0"/>
+              <a:t>(n) only applies to subclass</a:t>
+            </a:r>
+          </a:p>
+          <a:p>
+            <a:r>
+              <a:rPr lang="en-US" dirty="0" smtClean="0"/>
+              <a:t>Attributes are named slots in an instance where values are stored</a:t>
+            </a:r>
+          </a:p>
+          <a:p>
+            <a:pPr lvl="1"/>
+            <a:r>
+              <a:rPr lang="en-US" dirty="0" smtClean="0"/>
+              <a:t>Ex: Watches have time and date attributes, and </a:t>
+            </a:r>
+            <a:r>
+              <a:rPr lang="en-US" dirty="0" err="1" smtClean="0"/>
+              <a:t>CalculatorWatches</a:t>
+            </a:r>
+            <a:r>
+              <a:rPr lang="en-US" dirty="0" smtClean="0"/>
+              <a:t> also have a </a:t>
+            </a:r>
+            <a:r>
+              <a:rPr lang="en-US" dirty="0" err="1" smtClean="0"/>
+              <a:t>calculatorState</a:t>
+            </a:r>
+            <a:r>
+              <a:rPr lang="en-US" dirty="0" smtClean="0"/>
+              <a:t> attribute</a:t>
+            </a:r>
+            <a:endParaRPr lang="en-US" dirty="0"/>
+          </a:p>
+        </p:txBody>
+      </p:sp>
+      <p:pic>
+        <p:nvPicPr>
+          <p:cNvPr id="4" name="Picture 3"/>
+          <p:cNvPicPr>
+            <a:picLocks noChangeAspect="1"/>
+          </p:cNvPicPr>
+          <p:nvPr/>
+        </p:nvPicPr>
+        <p:blipFill rotWithShape="1">
+          <a:blip r:embed="rId2"/>
+          <a:srcRect l="12752" t="3676" r="11822" b="11661"/>
+          <a:stretch/>
+        </p:blipFill>
+        <p:spPr>
+          <a:xfrm>
+            <a:off x="5138056" y="4261756"/>
+            <a:ext cx="7053944" cy="2596244"/>
+          </a:xfrm>
+          <a:prstGeom prst="rect">
+            <a:avLst/>
+          </a:prstGeom>
+        </p:spPr>
+      </p:pic>
+    </p:spTree>
+    <p:extLst>
+      <p:ext uri="{BB962C8B-B14F-4D97-AF65-F5344CB8AC3E}">
+        <p14:creationId xmlns:p14="http://schemas.microsoft.com/office/powerpoint/2010/main" val="3199051550"/>
+      </p:ext>
+    </p:extLst>
+  </p:cSld>
+  <p:clrMapOvr>
+    <a:masterClrMapping/>
+  </p:clrMapOvr>
+</p:sld>
+</file>
+
+<file path=ppt/slides/slide6.xml><?xml version="1.0" encoding="utf-8"?>
+<p:sld xmlns:a="http://schemas.openxmlformats.org/drawingml/2006/main" xmlns:r="http://schemas.openxmlformats.org/officeDocument/2006/relationships" xmlns:p="http://schemas.openxmlformats.org/presentationml/2006/main">
+  <p:cSld>
+    <p:spTree>
+      <p:nvGrpSpPr>
+        <p:cNvPr id="1" name=""/>
+        <p:cNvGrpSpPr/>
+        <p:nvPr/>
+      </p:nvGrpSpPr>
+      <p:grpSpPr>
+        <a:xfrm>
+          <a:off x="0" y="0"/>
+          <a:ext cx="0" cy="0"/>
+          <a:chOff x="0" y="0"/>
+          <a:chExt cx="0" cy="0"/>
+        </a:xfrm>
+      </p:grpSpPr>
+      <p:sp>
+        <p:nvSpPr>
+          <p:cNvPr id="2" name="Title 1"/>
+          <p:cNvSpPr>
+            <a:spLocks noGrp="1"/>
+          </p:cNvSpPr>
+          <p:nvPr>
+            <p:ph type="title"/>
+          </p:nvPr>
+        </p:nvSpPr>
+        <p:spPr/>
+        <p:txBody>
+          <a:bodyPr/>
+          <a:lstStyle/>
+          <a:p>
+            <a:r>
+              <a:rPr lang="en-US" dirty="0" smtClean="0"/>
+              <a:t>Objects</a:t>
+            </a:r>
+            <a:endParaRPr lang="en-US" dirty="0"/>
+          </a:p>
+        </p:txBody>
+      </p:sp>
+      <p:sp>
+        <p:nvSpPr>
+          <p:cNvPr id="3" name="Content Placeholder 2"/>
+          <p:cNvSpPr>
+            <a:spLocks noGrp="1"/>
+          </p:cNvSpPr>
+          <p:nvPr>
+            <p:ph idx="1"/>
+          </p:nvPr>
+        </p:nvSpPr>
+        <p:spPr/>
+        <p:txBody>
+          <a:bodyPr/>
+          <a:lstStyle/>
+          <a:p>
+            <a:r>
+              <a:rPr lang="en-US" dirty="0" smtClean="0"/>
+              <a:t>Instance of a class, and has an identity and stores attribute values</a:t>
+            </a:r>
+          </a:p>
+          <a:p>
+            <a:r>
+              <a:rPr lang="en-US" dirty="0" smtClean="0"/>
+              <a:t>Each object belongs to exactly one class</a:t>
+            </a:r>
+          </a:p>
+          <a:p>
+            <a:r>
+              <a:rPr lang="en-US" dirty="0" smtClean="0"/>
+              <a:t>In UML, instances are depicted by rectangles with </a:t>
+            </a:r>
+            <a:r>
+              <a:rPr lang="en-US" u="sng" dirty="0" smtClean="0"/>
+              <a:t>underlined names</a:t>
+            </a:r>
+            <a:endParaRPr lang="en-US" u="sng" dirty="0"/>
+          </a:p>
+        </p:txBody>
+      </p:sp>
+      <p:pic>
+        <p:nvPicPr>
+          <p:cNvPr id="4" name="Picture 3"/>
+          <p:cNvPicPr>
+            <a:picLocks noChangeAspect="1"/>
+          </p:cNvPicPr>
+          <p:nvPr/>
+        </p:nvPicPr>
+        <p:blipFill rotWithShape="1">
+          <a:blip r:embed="rId2">
+            <a:extLst>
+              <a:ext uri="{28A0092B-C50C-407E-A947-70E740481C1C}">
+                <a14:useLocalDpi xmlns:a14="http://schemas.microsoft.com/office/drawing/2010/main" val="0"/>
+              </a:ext>
+            </a:extLst>
+          </a:blip>
+          <a:srcRect l="506" t="2407" r="539" b="4011"/>
+          <a:stretch/>
+        </p:blipFill>
+        <p:spPr>
+          <a:xfrm>
+            <a:off x="838200" y="3331028"/>
+            <a:ext cx="10466615" cy="3526972"/>
+          </a:xfrm>
+          <a:prstGeom prst="rect">
+            <a:avLst/>
+          </a:prstGeom>
+        </p:spPr>
+      </p:pic>
+    </p:spTree>
+    <p:extLst>
+      <p:ext uri="{BB962C8B-B14F-4D97-AF65-F5344CB8AC3E}">
+        <p14:creationId xmlns:p14="http://schemas.microsoft.com/office/powerpoint/2010/main" val="2768268279"/>
+      </p:ext>
+    </p:extLst>
+  </p:cSld>
+  <p:clrMapOvr>
+    <a:masterClrMapping/>
+  </p:clrMapOvr>
+</p:sld>
+</file>
+
+<file path=ppt/slides/slide7.xml><?xml version="1.0" encoding="utf-8"?>
+<p:sld xmlns:a="http://schemas.openxmlformats.org/drawingml/2006/main" xmlns:r="http://schemas.openxmlformats.org/officeDocument/2006/relationships" xmlns:p="http://schemas.openxmlformats.org/presentationml/2006/main">
+  <p:cSld>
+    <p:spTree>
+      <p:nvGrpSpPr>
+        <p:cNvPr id="1" name=""/>
+        <p:cNvGrpSpPr/>
+        <p:nvPr/>
+      </p:nvGrpSpPr>
+      <p:grpSpPr>
+        <a:xfrm>
+          <a:off x="0" y="0"/>
+          <a:ext cx="0" cy="0"/>
+          <a:chOff x="0" y="0"/>
+          <a:chExt cx="0" cy="0"/>
+        </a:xfrm>
+      </p:grpSpPr>
+      <p:sp>
+        <p:nvSpPr>
+          <p:cNvPr id="2" name="Title 1"/>
+          <p:cNvSpPr>
+            <a:spLocks noGrp="1"/>
+          </p:cNvSpPr>
+          <p:nvPr>
+            <p:ph type="title"/>
+          </p:nvPr>
+        </p:nvSpPr>
+        <p:spPr/>
+        <p:txBody>
+          <a:bodyPr/>
+          <a:lstStyle/>
+          <a:p>
+            <a:r>
+              <a:rPr lang="en-US" dirty="0" smtClean="0"/>
+              <a:t>Event Classes</a:t>
+            </a:r>
+            <a:endParaRPr lang="en-US" dirty="0"/>
+          </a:p>
+        </p:txBody>
+      </p:sp>
+      <p:sp>
+        <p:nvSpPr>
+          <p:cNvPr id="3" name="Content Placeholder 2"/>
+          <p:cNvSpPr>
+            <a:spLocks noGrp="1"/>
+          </p:cNvSpPr>
+          <p:nvPr>
+            <p:ph idx="1"/>
+          </p:nvPr>
+        </p:nvSpPr>
+        <p:spPr/>
+        <p:txBody>
+          <a:bodyPr/>
+          <a:lstStyle/>
+          <a:p>
+            <a:r>
+              <a:rPr lang="en-US" dirty="0" smtClean="0"/>
+              <a:t>Abstractions representing a type of event for which the system has a common response</a:t>
+            </a:r>
+          </a:p>
+          <a:p>
+            <a:r>
+              <a:rPr lang="en-US" dirty="0" smtClean="0"/>
+              <a:t>An </a:t>
+            </a:r>
+            <a:r>
+              <a:rPr lang="en-US" b="1" dirty="0" smtClean="0"/>
+              <a:t>event </a:t>
+            </a:r>
+            <a:r>
+              <a:rPr lang="en-US" dirty="0" smtClean="0"/>
+              <a:t>is an instance of an event class, and is a relevant occurrence in the system</a:t>
+            </a:r>
+          </a:p>
+          <a:p>
+            <a:pPr lvl="1"/>
+            <a:r>
+              <a:rPr lang="en-US" dirty="0" smtClean="0"/>
+              <a:t>Ex: user input, time-out, send a message between objects, etc.</a:t>
+            </a:r>
+          </a:p>
+          <a:p>
+            <a:pPr marL="0" indent="0">
+              <a:buNone/>
+            </a:pPr>
+            <a:endParaRPr lang="en-US" dirty="0" smtClean="0"/>
+          </a:p>
+        </p:txBody>
+      </p:sp>
+    </p:spTree>
+    <p:extLst>
+      <p:ext uri="{BB962C8B-B14F-4D97-AF65-F5344CB8AC3E}">
+        <p14:creationId xmlns:p14="http://schemas.microsoft.com/office/powerpoint/2010/main" val="1802085742"/>
+      </p:ext>
+    </p:extLst>
+  </p:cSld>
+  <p:clrMapOvr>
+    <a:masterClrMapping/>
+  </p:clrMapOvr>
+</p:sld>
+</file>
+
+<file path=ppt/slides/slide8.xml><?xml version="1.0" encoding="utf-8"?>
+<p:sld xmlns:a="http://schemas.openxmlformats.org/drawingml/2006/main" xmlns:r="http://schemas.openxmlformats.org/officeDocument/2006/relationships" xmlns:p="http://schemas.openxmlformats.org/presentationml/2006/main">
+  <p:cSld>
+    <p:spTree>
+      <p:nvGrpSpPr>
+        <p:cNvPr id="1" name=""/>
+        <p:cNvGrpSpPr/>
+        <p:nvPr/>
+      </p:nvGrpSpPr>
+      <p:grpSpPr>
+        <a:xfrm>
+          <a:off x="0" y="0"/>
+          <a:ext cx="0" cy="0"/>
+          <a:chOff x="0" y="0"/>
+          <a:chExt cx="0" cy="0"/>
+        </a:xfrm>
+      </p:grpSpPr>
+      <p:sp>
+        <p:nvSpPr>
+          <p:cNvPr id="2" name="Title 1"/>
+          <p:cNvSpPr>
+            <a:spLocks noGrp="1"/>
+          </p:cNvSpPr>
+          <p:nvPr>
+            <p:ph type="title"/>
+          </p:nvPr>
+        </p:nvSpPr>
+        <p:spPr/>
+        <p:txBody>
+          <a:bodyPr/>
+          <a:lstStyle/>
+          <a:p>
+            <a:r>
+              <a:rPr lang="en-US" dirty="0" smtClean="0"/>
+              <a:t>Messages</a:t>
+            </a:r>
+            <a:endParaRPr lang="en-US" dirty="0"/>
+          </a:p>
+        </p:txBody>
+      </p:sp>
+      <p:sp>
+        <p:nvSpPr>
+          <p:cNvPr id="3" name="Content Placeholder 2"/>
+          <p:cNvSpPr>
+            <a:spLocks noGrp="1"/>
+          </p:cNvSpPr>
+          <p:nvPr>
+            <p:ph idx="1"/>
+          </p:nvPr>
+        </p:nvSpPr>
+        <p:spPr/>
+        <p:txBody>
+          <a:bodyPr/>
+          <a:lstStyle/>
+          <a:p>
+            <a:r>
+              <a:rPr lang="en-US" dirty="0" smtClean="0"/>
+              <a:t>A message is made of a name and a number of arguments</a:t>
+            </a:r>
+          </a:p>
+          <a:p>
+            <a:r>
+              <a:rPr lang="en-US" dirty="0" smtClean="0"/>
+              <a:t>Sending a message is the process used by objects to call the execution of an operation of another object</a:t>
+            </a:r>
+          </a:p>
+          <a:p>
+            <a:pPr lvl="1"/>
+            <a:r>
+              <a:rPr lang="en-US" dirty="0" smtClean="0"/>
+              <a:t>Receiving object matches the message name to one of its operations, passes any arguments to it, and returns results to the sender</a:t>
+            </a:r>
+          </a:p>
+          <a:p>
+            <a:r>
+              <a:rPr lang="en-US" dirty="0" smtClean="0"/>
+              <a:t>Like objects, messages are instances, and represent </a:t>
+            </a:r>
+            <a:r>
+              <a:rPr lang="en-US" smtClean="0"/>
+              <a:t>concrete occurrences </a:t>
+            </a:r>
+            <a:r>
+              <a:rPr lang="en-US" dirty="0" smtClean="0"/>
+              <a:t>in the system</a:t>
+            </a:r>
+            <a:endParaRPr lang="en-US" dirty="0"/>
+          </a:p>
+        </p:txBody>
+      </p:sp>
+    </p:spTree>
+    <p:extLst>
+      <p:ext uri="{BB962C8B-B14F-4D97-AF65-F5344CB8AC3E}">
+        <p14:creationId xmlns:p14="http://schemas.microsoft.com/office/powerpoint/2010/main" val="628018943"/>
+      </p:ext>
+    </p:extLst>
+  </p:cSld>
+  <p:clrMapOvr>
+    <a:masterClrMapping/>
+  </p:clrMapOvr>
+</p:sld>
+</file>
+
+<file path=ppt/slides/slide9.xml><?xml version="1.0" encoding="utf-8"?>
+<p:sld xmlns:a="http://schemas.openxmlformats.org/drawingml/2006/main" xmlns:r="http://schemas.openxmlformats.org/officeDocument/2006/relationships" xmlns:p="http://schemas.openxmlformats.org/presentationml/2006/main">
+  <p:cSld>
+    <p:spTree>
+      <p:nvGrpSpPr>
+        <p:cNvPr id="1" name=""/>
+        <p:cNvGrpSpPr/>
+        <p:nvPr/>
+      </p:nvGrpSpPr>
+      <p:grpSpPr>
+        <a:xfrm>
+          <a:off x="0" y="0"/>
+          <a:ext cx="0" cy="0"/>
+          <a:chOff x="0" y="0"/>
+          <a:chExt cx="0" cy="0"/>
+        </a:xfrm>
+      </p:grpSpPr>
+      <p:sp>
+        <p:nvSpPr>
+          <p:cNvPr id="2" name="Title 1"/>
+          <p:cNvSpPr>
+            <a:spLocks noGrp="1"/>
+          </p:cNvSpPr>
+          <p:nvPr>
+            <p:ph type="title"/>
+          </p:nvPr>
+        </p:nvSpPr>
+        <p:spPr/>
+        <p:txBody>
+          <a:bodyPr/>
+          <a:lstStyle/>
+          <a:p>
+            <a:r>
+              <a:rPr lang="en-US" dirty="0" smtClean="0"/>
+              <a:t>Events example</a:t>
+            </a:r>
+            <a:endParaRPr lang="en-US" dirty="0"/>
+          </a:p>
+        </p:txBody>
+      </p:sp>
+      <p:sp>
+        <p:nvSpPr>
+          <p:cNvPr id="3" name="Content Placeholder 2"/>
+          <p:cNvSpPr>
+            <a:spLocks noGrp="1"/>
+          </p:cNvSpPr>
+          <p:nvPr>
+            <p:ph idx="1"/>
+          </p:nvPr>
+        </p:nvSpPr>
+        <p:spPr/>
+        <p:txBody>
+          <a:bodyPr/>
+          <a:lstStyle/>
+          <a:p>
+            <a:endParaRPr lang="en-US" dirty="0"/>
+          </a:p>
+        </p:txBody>
+      </p:sp>
+      <p:pic>
+        <p:nvPicPr>
+          <p:cNvPr id="6" name="Picture 5"/>
+          <p:cNvPicPr>
+            <a:picLocks noChangeAspect="1"/>
+          </p:cNvPicPr>
+          <p:nvPr/>
+        </p:nvPicPr>
+        <p:blipFill>
+          <a:blip r:embed="rId2"/>
+          <a:stretch>
+            <a:fillRect/>
+          </a:stretch>
+        </p:blipFill>
+        <p:spPr>
+          <a:xfrm>
+            <a:off x="838199" y="1387011"/>
+            <a:ext cx="9999133" cy="5346263"/>
+          </a:xfrm>
+          <a:prstGeom prst="rect">
+            <a:avLst/>
+          </a:prstGeom>
+        </p:spPr>
+      </p:pic>
+    </p:spTree>
+    <p:extLst>
+      <p:ext uri="{BB962C8B-B14F-4D97-AF65-F5344CB8AC3E}">
+        <p14:creationId xmlns:p14="http://schemas.microsoft.com/office/powerpoint/2010/main" val="2607816317"/>
       </p:ext>
     </p:extLst>
   </p:cSld>

</xml_diff>